<commit_message>
Update Apresentação Individual - Inês
</commit_message>
<xml_diff>
--- a/Documentos/4. Apresentação Individual/Inês/Apresentacao.pptx
+++ b/Documentos/4. Apresentação Individual/Inês/Apresentacao.pptx
@@ -3331,17 +3331,35 @@
         <a:lstStyle/>
         <a:p>
           <a:r>
-            <a:rPr lang="en-US" sz="2800" dirty="0" err="1"/>
-            <a:t>Motivação</a:t>
+            <a:rPr lang="pt-PT" sz="2800" dirty="0">
+              <a:latin typeface="Gill Sans MT" panose="020B0502020104020203" pitchFamily="34" charset="0"/>
+            </a:rPr>
+            <a:t>Tecnologias utilizadas nas</a:t>
+          </a:r>
+          <a:br>
+            <a:rPr lang="pt-PT" sz="2800" dirty="0">
+              <a:latin typeface="Gill Sans MT" panose="020B0502020104020203" pitchFamily="34" charset="0"/>
+            </a:rPr>
+          </a:br>
+          <a:r>
+            <a:rPr lang="pt-PT" sz="2800" i="1" dirty="0" err="1">
+              <a:latin typeface="Gill Sans MT" panose="020B0502020104020203" pitchFamily="34" charset="0"/>
+            </a:rPr>
+            <a:t>Smart</a:t>
           </a:r>
           <a:r>
-            <a:rPr lang="en-US" sz="2800" dirty="0"/>
-            <a:t> para as </a:t>
+            <a:rPr lang="pt-PT" sz="2800" i="1" dirty="0">
+              <a:latin typeface="Gill Sans MT" panose="020B0502020104020203" pitchFamily="34" charset="0"/>
+            </a:rPr>
+            <a:t> </a:t>
           </a:r>
           <a:r>
-            <a:rPr lang="en-US" sz="2800" i="1" dirty="0"/>
-            <a:t>Smart Cities</a:t>
+            <a:rPr lang="pt-PT" sz="2800" i="1" dirty="0" err="1">
+              <a:latin typeface="Gill Sans MT" panose="020B0502020104020203" pitchFamily="34" charset="0"/>
+            </a:rPr>
+            <a:t>Cities</a:t>
           </a:r>
+          <a:endParaRPr lang="en-US" sz="2800" i="1" dirty="0"/>
         </a:p>
       </dgm:t>
     </dgm:pt>
@@ -5162,17 +5180,35 @@
             <a:buNone/>
           </a:pPr>
           <a:r>
-            <a:rPr lang="en-US" sz="2800" kern="1200" dirty="0" err="1"/>
-            <a:t>Motivação</a:t>
+            <a:rPr lang="pt-PT" sz="2800" kern="1200" dirty="0">
+              <a:latin typeface="Gill Sans MT" panose="020B0502020104020203" pitchFamily="34" charset="0"/>
+            </a:rPr>
+            <a:t>Tecnologias utilizadas nas</a:t>
+          </a:r>
+          <a:br>
+            <a:rPr lang="pt-PT" sz="2800" kern="1200" dirty="0">
+              <a:latin typeface="Gill Sans MT" panose="020B0502020104020203" pitchFamily="34" charset="0"/>
+            </a:rPr>
+          </a:br>
+          <a:r>
+            <a:rPr lang="pt-PT" sz="2800" i="1" kern="1200" dirty="0" err="1">
+              <a:latin typeface="Gill Sans MT" panose="020B0502020104020203" pitchFamily="34" charset="0"/>
+            </a:rPr>
+            <a:t>Smart</a:t>
           </a:r>
           <a:r>
-            <a:rPr lang="en-US" sz="2800" kern="1200" dirty="0"/>
-            <a:t> para as </a:t>
+            <a:rPr lang="pt-PT" sz="2800" i="1" kern="1200" dirty="0">
+              <a:latin typeface="Gill Sans MT" panose="020B0502020104020203" pitchFamily="34" charset="0"/>
+            </a:rPr>
+            <a:t> </a:t>
           </a:r>
           <a:r>
-            <a:rPr lang="en-US" sz="2800" i="1" kern="1200" dirty="0"/>
-            <a:t>Smart Cities</a:t>
+            <a:rPr lang="pt-PT" sz="2800" i="1" kern="1200" dirty="0" err="1">
+              <a:latin typeface="Gill Sans MT" panose="020B0502020104020203" pitchFamily="34" charset="0"/>
+            </a:rPr>
+            <a:t>Cities</a:t>
           </a:r>
+          <a:endParaRPr lang="en-US" sz="2800" i="1" kern="1200" dirty="0"/>
         </a:p>
       </dsp:txBody>
       <dsp:txXfrm>
@@ -15209,7 +15245,7 @@
           <a:p>
             <a:fld id="{ACCCF879-775B-4DC1-9F92-801A9C2ADE8A}" type="datetimeFigureOut">
               <a:rPr lang="pt-PT" smtClean="0"/>
-              <a:t>26/04/2018</a:t>
+              <a:t>29/04/2018</a:t>
             </a:fld>
             <a:endParaRPr lang="pt-PT"/>
           </a:p>
@@ -15618,7 +15654,7 @@
           <a:p>
             <a:fld id="{E06EBAFE-E282-407E-8820-D659E2DE0CBE}" type="datetime1">
               <a:rPr lang="pt-PT" smtClean="0"/>
-              <a:t>26/04/2018</a:t>
+              <a:t>29/04/2018</a:t>
             </a:fld>
             <a:endParaRPr lang="pt-PT"/>
           </a:p>
@@ -15791,7 +15827,7 @@
           <a:p>
             <a:fld id="{B186F18B-7D61-4563-ABFD-17E528511FDB}" type="datetime1">
               <a:rPr lang="pt-PT" smtClean="0"/>
-              <a:t>26/04/2018</a:t>
+              <a:t>29/04/2018</a:t>
             </a:fld>
             <a:endParaRPr lang="pt-PT"/>
           </a:p>
@@ -15974,7 +16010,7 @@
           <a:p>
             <a:fld id="{CD816DD2-A480-4633-B0DD-D245FF7C9851}" type="datetime1">
               <a:rPr lang="pt-PT" smtClean="0"/>
-              <a:t>26/04/2018</a:t>
+              <a:t>29/04/2018</a:t>
             </a:fld>
             <a:endParaRPr lang="pt-PT"/>
           </a:p>
@@ -16264,7 +16300,7 @@
           <a:p>
             <a:fld id="{0360BB6C-A1E5-474D-A7EA-6FAD50C04660}" type="datetime1">
               <a:rPr lang="pt-PT" smtClean="0"/>
-              <a:t>26/04/2018</a:t>
+              <a:t>29/04/2018</a:t>
             </a:fld>
             <a:endParaRPr lang="pt-PT"/>
           </a:p>
@@ -16475,7 +16511,7 @@
           <a:p>
             <a:fld id="{DFA68BEE-7741-4769-A3C2-66E79D2B7CE6}" type="datetime1">
               <a:rPr lang="pt-PT" smtClean="0"/>
-              <a:t>26/04/2018</a:t>
+              <a:t>29/04/2018</a:t>
             </a:fld>
             <a:endParaRPr lang="pt-PT"/>
           </a:p>
@@ -16821,7 +16857,7 @@
           <a:p>
             <a:fld id="{A64B67C4-7D96-4CE4-9E59-98772F728B11}" type="datetime1">
               <a:rPr lang="pt-PT" smtClean="0"/>
-              <a:t>26/04/2018</a:t>
+              <a:t>29/04/2018</a:t>
             </a:fld>
             <a:endParaRPr lang="pt-PT"/>
           </a:p>
@@ -17099,7 +17135,7 @@
           <a:p>
             <a:fld id="{30ABDD8A-F922-4145-BB5C-0303F89811F4}" type="datetime1">
               <a:rPr lang="pt-PT" smtClean="0"/>
-              <a:t>26/04/2018</a:t>
+              <a:t>29/04/2018</a:t>
             </a:fld>
             <a:endParaRPr lang="pt-PT"/>
           </a:p>
@@ -17481,7 +17517,7 @@
           <a:p>
             <a:fld id="{766049C1-E83B-47B7-9B0C-78EF12E7619D}" type="datetime1">
               <a:rPr lang="pt-PT" smtClean="0"/>
-              <a:t>26/04/2018</a:t>
+              <a:t>29/04/2018</a:t>
             </a:fld>
             <a:endParaRPr lang="pt-PT"/>
           </a:p>
@@ -17602,7 +17638,7 @@
           <a:p>
             <a:fld id="{411C1CCD-3CE9-4213-A0E6-B643AF06A7FD}" type="datetime1">
               <a:rPr lang="pt-PT" smtClean="0"/>
-              <a:t>26/04/2018</a:t>
+              <a:t>29/04/2018</a:t>
             </a:fld>
             <a:endParaRPr lang="pt-PT"/>
           </a:p>
@@ -17776,7 +17812,7 @@
           <a:p>
             <a:fld id="{B819019D-39D5-4615-8350-E181390DF522}" type="datetime1">
               <a:rPr lang="pt-PT" smtClean="0"/>
-              <a:t>26/04/2018</a:t>
+              <a:t>29/04/2018</a:t>
             </a:fld>
             <a:endParaRPr lang="pt-PT"/>
           </a:p>
@@ -18133,7 +18169,7 @@
           <a:p>
             <a:fld id="{F6BDEB3B-92AD-4BF5-8244-A285DC232243}" type="datetime1">
               <a:rPr lang="pt-PT" smtClean="0"/>
-              <a:t>26/04/2018</a:t>
+              <a:t>29/04/2018</a:t>
             </a:fld>
             <a:endParaRPr lang="pt-PT"/>
           </a:p>
@@ -18327,7 +18363,7 @@
           <a:p>
             <a:fld id="{822D2295-34CD-4C4E-827E-28605EC01E4D}" type="datetime1">
               <a:rPr lang="pt-PT" smtClean="0"/>
-              <a:t>26/04/2018</a:t>
+              <a:t>29/04/2018</a:t>
             </a:fld>
             <a:endParaRPr lang="pt-PT"/>
           </a:p>
@@ -18686,7 +18722,7 @@
           <a:p>
             <a:fld id="{03422FC1-B2AB-4D1E-A33C-2F66269BCB5F}" type="datetime1">
               <a:rPr lang="pt-PT" smtClean="0"/>
-              <a:t>26/04/2018</a:t>
+              <a:t>29/04/2018</a:t>
             </a:fld>
             <a:endParaRPr lang="pt-PT"/>
           </a:p>
@@ -18859,7 +18895,7 @@
           <a:p>
             <a:fld id="{3E53A5E1-7DB7-4EDF-A26C-9A2D50A97012}" type="datetime1">
               <a:rPr lang="pt-PT" smtClean="0"/>
-              <a:t>26/04/2018</a:t>
+              <a:t>29/04/2018</a:t>
             </a:fld>
             <a:endParaRPr lang="pt-PT"/>
           </a:p>
@@ -19118,7 +19154,7 @@
           <a:p>
             <a:fld id="{BE5883F6-086F-45A2-AF2C-8BC8C02A0CC7}" type="datetime1">
               <a:rPr lang="pt-PT" smtClean="0"/>
-              <a:t>26/04/2018</a:t>
+              <a:t>29/04/2018</a:t>
             </a:fld>
             <a:endParaRPr lang="pt-PT"/>
           </a:p>
@@ -19372,7 +19408,7 @@
           <a:p>
             <a:fld id="{3BEDBF07-148A-4E3E-8BB9-8A4F430559B3}" type="datetime1">
               <a:rPr lang="pt-PT" smtClean="0"/>
-              <a:t>26/04/2018</a:t>
+              <a:t>29/04/2018</a:t>
             </a:fld>
             <a:endParaRPr lang="pt-PT"/>
           </a:p>
@@ -19607,7 +19643,7 @@
           <a:p>
             <a:fld id="{C30C56F1-5D12-43F8-A6B4-EF57E60989A5}" type="datetime1">
               <a:rPr lang="pt-PT" smtClean="0"/>
-              <a:t>26/04/2018</a:t>
+              <a:t>29/04/2018</a:t>
             </a:fld>
             <a:endParaRPr lang="pt-PT"/>
           </a:p>
@@ -19957,7 +19993,7 @@
           <a:p>
             <a:fld id="{706B5CB6-49D5-42A0-9C67-0F8195B9C72F}" type="datetime1">
               <a:rPr lang="pt-PT" smtClean="0"/>
-              <a:t>26/04/2018</a:t>
+              <a:t>29/04/2018</a:t>
             </a:fld>
             <a:endParaRPr lang="pt-PT"/>
           </a:p>
@@ -20078,7 +20114,7 @@
           <a:p>
             <a:fld id="{E5B22639-E731-4079-AF82-529E2315F231}" type="datetime1">
               <a:rPr lang="pt-PT" smtClean="0"/>
-              <a:t>26/04/2018</a:t>
+              <a:t>29/04/2018</a:t>
             </a:fld>
             <a:endParaRPr lang="pt-PT"/>
           </a:p>
@@ -20199,7 +20235,7 @@
           <a:p>
             <a:fld id="{4F13C1C9-920F-4A26-BEBB-E4EF9B5216D5}" type="datetime1">
               <a:rPr lang="pt-PT" smtClean="0"/>
-              <a:t>26/04/2018</a:t>
+              <a:t>29/04/2018</a:t>
             </a:fld>
             <a:endParaRPr lang="pt-PT"/>
           </a:p>
@@ -20486,7 +20522,7 @@
           <a:p>
             <a:fld id="{5B4A7865-2456-4903-A2F1-CA6C5A16AF69}" type="datetime1">
               <a:rPr lang="pt-PT" smtClean="0"/>
-              <a:t>26/04/2018</a:t>
+              <a:t>29/04/2018</a:t>
             </a:fld>
             <a:endParaRPr lang="pt-PT"/>
           </a:p>
@@ -20753,7 +20789,7 @@
           <a:p>
             <a:fld id="{207FD7B2-AAE8-4EB3-B5C8-8574E566C19F}" type="datetime1">
               <a:rPr lang="pt-PT" smtClean="0"/>
-              <a:t>26/04/2018</a:t>
+              <a:t>29/04/2018</a:t>
             </a:fld>
             <a:endParaRPr lang="pt-PT"/>
           </a:p>
@@ -20970,7 +21006,7 @@
           <a:p>
             <a:fld id="{B8E86262-7B0C-43F5-9B8A-33474B1C6356}" type="datetime1">
               <a:rPr lang="pt-PT" smtClean="0"/>
-              <a:t>26/04/2018</a:t>
+              <a:t>29/04/2018</a:t>
             </a:fld>
             <a:endParaRPr lang="pt-PT"/>
           </a:p>
@@ -21577,7 +21613,7 @@
           <a:p>
             <a:fld id="{EE09A993-B8DA-43F8-BF4A-B4C4CC0771DF}" type="datetime1">
               <a:rPr lang="pt-PT" smtClean="0"/>
-              <a:t>26/04/2018</a:t>
+              <a:t>29/04/2018</a:t>
             </a:fld>
             <a:endParaRPr lang="pt-PT"/>
           </a:p>
@@ -22375,7 +22411,7 @@
                 </a:solidFill>
                 <a:latin typeface="Century Gothic" panose="020B0502020202020204" pitchFamily="34" charset="0"/>
               </a:rPr>
-              <a:t>26/04/2018</a:t>
+              <a:t>29/04/2018</a:t>
             </a:fld>
             <a:endParaRPr lang="pt-PT" sz="1600" dirty="0">
               <a:solidFill>
@@ -22703,7 +22739,7 @@
             <p:ph idx="1"/>
             <p:extLst>
               <p:ext uri="{D42A27DB-BD31-4B8C-83A1-F6EECF244321}">
-                <p14:modId xmlns:p14="http://schemas.microsoft.com/office/powerpoint/2010/main" val="3942976776"/>
+                <p14:modId xmlns:p14="http://schemas.microsoft.com/office/powerpoint/2010/main" val="836838646"/>
               </p:ext>
             </p:extLst>
           </p:nvPr>
@@ -22760,7 +22796,7 @@
                   <a:spcPts val="600"/>
                 </a:spcAft>
               </a:pPr>
-              <a:t>26/04/2018</a:t>
+              <a:t>29/04/2018</a:t>
             </a:fld>
             <a:endParaRPr lang="pt-PT" dirty="0">
               <a:latin typeface="Century Gothic" panose="020B0502020202020204" pitchFamily="34" charset="0"/>
@@ -23222,7 +23258,7 @@
               <a:rPr lang="pt-PT" sz="1400" smtClean="0">
                 <a:latin typeface="Century Gothic" panose="020B0502020202020204" pitchFamily="34" charset="0"/>
               </a:rPr>
-              <a:t>26/04/2018</a:t>
+              <a:t>29/04/2018</a:t>
             </a:fld>
             <a:endParaRPr lang="pt-PT" sz="1400" dirty="0">
               <a:latin typeface="Century Gothic" panose="020B0502020202020204" pitchFamily="34" charset="0"/>
@@ -23385,7 +23421,7 @@
                 <a:latin typeface="Century Gothic" panose="020B0502020202020204" pitchFamily="34" charset="0"/>
               </a:rPr>
               <a:pPr/>
-              <a:t>26/04/2018</a:t>
+              <a:t>29/04/2018</a:t>
             </a:fld>
             <a:endParaRPr lang="pt-PT" dirty="0">
               <a:latin typeface="Century Gothic" panose="020B0502020202020204" pitchFamily="34" charset="0"/>
@@ -23479,8 +23515,8 @@
         </p:nvSpPr>
         <p:spPr>
           <a:xfrm>
-            <a:off x="176981" y="516835"/>
-            <a:ext cx="2802193" cy="5772840"/>
+            <a:off x="-104774" y="516835"/>
+            <a:ext cx="3264924" cy="5772840"/>
           </a:xfrm>
         </p:spPr>
         <p:txBody>
@@ -23492,36 +23528,29 @@
             <a:pPr algn="ctr"/>
             <a:r>
               <a:rPr lang="pt-PT" sz="4000" dirty="0">
-                <a:solidFill>
-                  <a:srgbClr val="FFFFFF"/>
-                </a:solidFill>
                 <a:latin typeface="Gill Sans MT" panose="020B0502020104020203" pitchFamily="34" charset="0"/>
               </a:rPr>
-              <a:t>Motivação para as </a:t>
+              <a:t>Tecnologias utilizadas nas</a:t>
             </a:r>
+            <a:br>
+              <a:rPr lang="pt-PT" sz="4000" dirty="0">
+                <a:latin typeface="Gill Sans MT" panose="020B0502020104020203" pitchFamily="34" charset="0"/>
+              </a:rPr>
+            </a:br>
             <a:r>
               <a:rPr lang="pt-PT" sz="4000" i="1" dirty="0" err="1">
-                <a:solidFill>
-                  <a:srgbClr val="FFFFFF"/>
-                </a:solidFill>
                 <a:latin typeface="Gill Sans MT" panose="020B0502020104020203" pitchFamily="34" charset="0"/>
               </a:rPr>
               <a:t>Smart</a:t>
             </a:r>
             <a:r>
               <a:rPr lang="pt-PT" sz="4000" i="1" dirty="0">
-                <a:solidFill>
-                  <a:srgbClr val="FFFFFF"/>
-                </a:solidFill>
                 <a:latin typeface="Gill Sans MT" panose="020B0502020104020203" pitchFamily="34" charset="0"/>
               </a:rPr>
               <a:t> </a:t>
             </a:r>
             <a:r>
               <a:rPr lang="pt-PT" sz="4000" i="1" dirty="0" err="1">
-                <a:solidFill>
-                  <a:srgbClr val="FFFFFF"/>
-                </a:solidFill>
                 <a:latin typeface="Gill Sans MT" panose="020B0502020104020203" pitchFamily="34" charset="0"/>
               </a:rPr>
               <a:t>Cities</a:t>
@@ -23674,7 +23703,7 @@
               <a:rPr lang="pt-PT" sz="1400" smtClean="0">
                 <a:latin typeface="Century Gothic" panose="020B0502020202020204" pitchFamily="34" charset="0"/>
               </a:rPr>
-              <a:t>26/04/2018</a:t>
+              <a:t>29/04/2018</a:t>
             </a:fld>
             <a:endParaRPr lang="pt-PT" sz="1400" dirty="0">
               <a:latin typeface="Century Gothic" panose="020B0502020202020204" pitchFamily="34" charset="0"/>
@@ -24263,7 +24292,7 @@
               <a:rPr lang="pt-PT" sz="1400" smtClean="0">
                 <a:latin typeface="Century Gothic" panose="020B0502020202020204" pitchFamily="34" charset="0"/>
               </a:rPr>
-              <a:t>26/04/2018</a:t>
+              <a:t>29/04/2018</a:t>
             </a:fld>
             <a:endParaRPr lang="pt-PT" sz="1400" dirty="0">
               <a:latin typeface="Century Gothic" panose="020B0502020202020204" pitchFamily="34" charset="0"/>
@@ -24336,42 +24365,6 @@
       </p:sp>
       <p:pic>
         <p:nvPicPr>
-          <p:cNvPr id="7" name="Imagem 6">
-            <a:extLst>
-              <a:ext uri="{FF2B5EF4-FFF2-40B4-BE49-F238E27FC236}">
-                <a16:creationId xmlns:a16="http://schemas.microsoft.com/office/drawing/2014/main" id="{95D224AF-5C4F-4916-87DC-6A2F7800EF8E}"/>
-              </a:ext>
-            </a:extLst>
-          </p:cNvPr>
-          <p:cNvPicPr>
-            <a:picLocks noChangeAspect="1"/>
-          </p:cNvPicPr>
-          <p:nvPr/>
-        </p:nvPicPr>
-        <p:blipFill>
-          <a:blip r:embed="rId2">
-            <a:extLst>
-              <a:ext uri="{28A0092B-C50C-407E-A947-70E740481C1C}">
-                <a14:useLocalDpi xmlns:a14="http://schemas.microsoft.com/office/drawing/2010/main" val="0"/>
-              </a:ext>
-            </a:extLst>
-          </a:blip>
-          <a:stretch>
-            <a:fillRect/>
-          </a:stretch>
-        </p:blipFill>
-        <p:spPr>
-          <a:xfrm>
-            <a:off x="822960" y="2989005"/>
-            <a:ext cx="1554754" cy="3109507"/>
-          </a:xfrm>
-          <a:prstGeom prst="rect">
-            <a:avLst/>
-          </a:prstGeom>
-        </p:spPr>
-      </p:pic>
-      <p:pic>
-        <p:nvPicPr>
           <p:cNvPr id="9" name="Imagem 8">
             <a:extLst>
               <a:ext uri="{FF2B5EF4-FFF2-40B4-BE49-F238E27FC236}">
@@ -24385,7 +24378,7 @@
           <p:nvPr/>
         </p:nvPicPr>
         <p:blipFill>
-          <a:blip r:embed="rId3">
+          <a:blip r:embed="rId2">
             <a:extLst>
               <a:ext uri="{28A0092B-C50C-407E-A947-70E740481C1C}">
                 <a14:useLocalDpi xmlns:a14="http://schemas.microsoft.com/office/drawing/2010/main" val="0"/>
@@ -24421,7 +24414,7 @@
           <p:nvPr/>
         </p:nvPicPr>
         <p:blipFill>
-          <a:blip r:embed="rId4">
+          <a:blip r:embed="rId3">
             <a:extLst>
               <a:ext uri="{28A0092B-C50C-407E-A947-70E740481C1C}">
                 <a14:useLocalDpi xmlns:a14="http://schemas.microsoft.com/office/drawing/2010/main" val="0"/>
@@ -24434,7 +24427,7 @@
         </p:blipFill>
         <p:spPr>
           <a:xfrm>
-            <a:off x="2485839" y="4442825"/>
+            <a:off x="2948171" y="4608447"/>
             <a:ext cx="1864513" cy="1655687"/>
           </a:xfrm>
           <a:prstGeom prst="rect">
@@ -24457,7 +24450,7 @@
           <p:nvPr/>
         </p:nvPicPr>
         <p:blipFill>
-          <a:blip r:embed="rId5">
+          <a:blip r:embed="rId4">
             <a:extLst>
               <a:ext uri="{28A0092B-C50C-407E-A947-70E740481C1C}">
                 <a14:useLocalDpi xmlns:a14="http://schemas.microsoft.com/office/drawing/2010/main" val="0"/>
@@ -24493,7 +24486,7 @@
           <p:nvPr/>
         </p:nvPicPr>
         <p:blipFill>
-          <a:blip r:embed="rId6">
+          <a:blip r:embed="rId5">
             <a:extLst>
               <a:ext uri="{28A0092B-C50C-407E-A947-70E740481C1C}">
                 <a14:useLocalDpi xmlns:a14="http://schemas.microsoft.com/office/drawing/2010/main" val="0"/>
@@ -24506,7 +24499,7 @@
         </p:blipFill>
         <p:spPr>
           <a:xfrm>
-            <a:off x="2764639" y="2609645"/>
+            <a:off x="2885289" y="2609645"/>
             <a:ext cx="2814410" cy="2251528"/>
           </a:xfrm>
           <a:prstGeom prst="rect">
@@ -24529,7 +24522,7 @@
           <p:nvPr/>
         </p:nvPicPr>
         <p:blipFill rotWithShape="1">
-          <a:blip r:embed="rId7">
+          <a:blip r:embed="rId6">
             <a:extLst>
               <a:ext uri="{28A0092B-C50C-407E-A947-70E740481C1C}">
                 <a14:useLocalDpi xmlns:a14="http://schemas.microsoft.com/office/drawing/2010/main" val="0"/>
@@ -24624,7 +24617,7 @@
             <p:nvPr/>
           </p:nvPicPr>
           <p:blipFill>
-            <a:blip r:embed="rId8">
+            <a:blip r:embed="rId7">
               <a:extLst>
                 <a:ext uri="{28A0092B-C50C-407E-A947-70E740481C1C}">
                   <a14:useLocalDpi xmlns:a14="http://schemas.microsoft.com/office/drawing/2010/main" val="0"/>
@@ -24660,7 +24653,7 @@
             <p:nvPr/>
           </p:nvPicPr>
           <p:blipFill>
-            <a:blip r:embed="rId9"/>
+            <a:blip r:embed="rId8"/>
             <a:stretch>
               <a:fillRect/>
             </a:stretch>
@@ -24709,7 +24702,7 @@
                 <a:solidFill>
                   <a:srgbClr val="33CCFF"/>
                 </a:solidFill>
-                <a:hlinkClick r:id="rId10"/>
+                <a:hlinkClick r:id="rId9"/>
               </a:rPr>
               <a:t>https://lisboainteligente.cm-lisboa.pt</a:t>
             </a:r>
@@ -24724,6 +24717,78 @@
           </a:p>
         </p:txBody>
       </p:sp>
+      <p:pic>
+        <p:nvPicPr>
+          <p:cNvPr id="12" name="Imagem 11">
+            <a:extLst>
+              <a:ext uri="{FF2B5EF4-FFF2-40B4-BE49-F238E27FC236}">
+                <a16:creationId xmlns:a16="http://schemas.microsoft.com/office/drawing/2014/main" id="{082EB5B8-AF9A-4DB4-B3C9-88D15BAA36FC}"/>
+              </a:ext>
+            </a:extLst>
+          </p:cNvPr>
+          <p:cNvPicPr>
+            <a:picLocks noChangeAspect="1"/>
+          </p:cNvPicPr>
+          <p:nvPr/>
+        </p:nvPicPr>
+        <p:blipFill>
+          <a:blip r:embed="rId10">
+            <a:extLst>
+              <a:ext uri="{28A0092B-C50C-407E-A947-70E740481C1C}">
+                <a14:useLocalDpi xmlns:a14="http://schemas.microsoft.com/office/drawing/2010/main" val="0"/>
+              </a:ext>
+            </a:extLst>
+          </a:blip>
+          <a:stretch>
+            <a:fillRect/>
+          </a:stretch>
+        </p:blipFill>
+        <p:spPr>
+          <a:xfrm>
+            <a:off x="919459" y="2972430"/>
+            <a:ext cx="1893397" cy="3234554"/>
+          </a:xfrm>
+          <a:prstGeom prst="rect">
+            <a:avLst/>
+          </a:prstGeom>
+        </p:spPr>
+      </p:pic>
+      <p:pic>
+        <p:nvPicPr>
+          <p:cNvPr id="14" name="Imagem 13">
+            <a:extLst>
+              <a:ext uri="{FF2B5EF4-FFF2-40B4-BE49-F238E27FC236}">
+                <a16:creationId xmlns:a16="http://schemas.microsoft.com/office/drawing/2014/main" id="{3BBA2242-02B0-4BDB-9633-4E3D4BD29DB5}"/>
+              </a:ext>
+            </a:extLst>
+          </p:cNvPr>
+          <p:cNvPicPr>
+            <a:picLocks noChangeAspect="1"/>
+          </p:cNvPicPr>
+          <p:nvPr/>
+        </p:nvPicPr>
+        <p:blipFill>
+          <a:blip r:embed="rId11">
+            <a:extLst>
+              <a:ext uri="{28A0092B-C50C-407E-A947-70E740481C1C}">
+                <a14:useLocalDpi xmlns:a14="http://schemas.microsoft.com/office/drawing/2010/main" val="0"/>
+              </a:ext>
+            </a:extLst>
+          </a:blip>
+          <a:stretch>
+            <a:fillRect/>
+          </a:stretch>
+        </p:blipFill>
+        <p:spPr>
+          <a:xfrm>
+            <a:off x="2812856" y="2974492"/>
+            <a:ext cx="374844" cy="374844"/>
+          </a:xfrm>
+          <a:prstGeom prst="rect">
+            <a:avLst/>
+          </a:prstGeom>
+        </p:spPr>
+      </p:pic>
     </p:spTree>
     <p:extLst>
       <p:ext uri="{BB962C8B-B14F-4D97-AF65-F5344CB8AC3E}">
@@ -25116,7 +25181,7 @@
               <a:rPr lang="pt-PT" sz="1400" smtClean="0">
                 <a:latin typeface="Century Gothic" panose="020B0502020202020204" pitchFamily="34" charset="0"/>
               </a:rPr>
-              <a:t>26/04/2018</a:t>
+              <a:t>29/04/2018</a:t>
             </a:fld>
             <a:endParaRPr lang="en-US" sz="1400" dirty="0">
               <a:latin typeface="Century Gothic" panose="020B0502020202020204" pitchFamily="34" charset="0"/>

</xml_diff>

<commit_message>
Update Apresentacao Individual - Inês
</commit_message>
<xml_diff>
--- a/Documentos/4. Apresentação Individual/Inês/Apresentacao.pptx
+++ b/Documentos/4. Apresentação Individual/Inês/Apresentacao.pptx
@@ -4506,10 +4506,10 @@
         <a:lstStyle/>
         <a:p>
           <a:r>
-            <a:rPr lang="pt-PT" i="1" dirty="0"/>
+            <a:rPr lang="pt-PT" i="0" dirty="0"/>
             <a:t>O conceito de cidades inteligentes persistirá no futuro. </a:t>
           </a:r>
-          <a:endParaRPr lang="en-US" i="1" dirty="0"/>
+          <a:endParaRPr lang="en-US" i="0" dirty="0"/>
         </a:p>
       </dgm:t>
     </dgm:pt>
@@ -4543,7 +4543,7 @@
         <a:lstStyle/>
         <a:p>
           <a:r>
-            <a:rPr lang="pt-PT" dirty="0"/>
+            <a:rPr lang="pt-PT" i="0" dirty="0"/>
             <a:t>As </a:t>
           </a:r>
           <a:r>
@@ -4560,13 +4560,13 @@
           </a:r>
           <a:r>
             <a:rPr lang="pt-PT" i="1" dirty="0"/>
-            <a:t> podem melhorar em muito a vida na cidade</a:t>
+            <a:t> </a:t>
           </a:r>
           <a:r>
-            <a:rPr lang="pt-PT" dirty="0"/>
-            <a:t>.</a:t>
+            <a:rPr lang="pt-PT" i="0" dirty="0"/>
+            <a:t>podem melhorar em muito a vida na cidade.</a:t>
           </a:r>
-          <a:endParaRPr lang="en-US" dirty="0"/>
+          <a:endParaRPr lang="en-US" i="0" dirty="0"/>
         </a:p>
       </dgm:t>
     </dgm:pt>
@@ -4600,10 +4600,10 @@
         <a:lstStyle/>
         <a:p>
           <a:r>
-            <a:rPr lang="pt-PT" i="1" dirty="0"/>
+            <a:rPr lang="pt-PT" i="0" dirty="0"/>
             <a:t>Perda da privacidade da informação.</a:t>
           </a:r>
-          <a:endParaRPr lang="en-US" i="1" dirty="0"/>
+          <a:endParaRPr lang="en-US" i="0" dirty="0"/>
         </a:p>
       </dgm:t>
     </dgm:pt>
@@ -4637,7 +4637,7 @@
         <a:lstStyle/>
         <a:p>
           <a:r>
-            <a:rPr lang="pt-PT" i="1" u="none" dirty="0"/>
+            <a:rPr lang="pt-PT" i="0" u="none" dirty="0"/>
             <a:t>Expansão das </a:t>
           </a:r>
           <a:r>
@@ -4654,7 +4654,11 @@
           </a:r>
           <a:r>
             <a:rPr lang="pt-PT" i="1" u="none" dirty="0"/>
-            <a:t> até às </a:t>
+            <a:t> </a:t>
+          </a:r>
+          <a:r>
+            <a:rPr lang="pt-PT" i="0" u="none" dirty="0"/>
+            <a:t>até às </a:t>
           </a:r>
           <a:r>
             <a:rPr lang="pt-PT" i="1" u="none" dirty="0" err="1"/>
@@ -4673,10 +4677,10 @@
             <a:t>homes</a:t>
           </a:r>
           <a:r>
-            <a:rPr lang="pt-PT" i="1" dirty="0"/>
+            <a:rPr lang="pt-PT" i="0" dirty="0"/>
             <a:t>.</a:t>
           </a:r>
-          <a:endParaRPr lang="en-US" i="1" dirty="0"/>
+          <a:endParaRPr lang="en-US" i="0" dirty="0"/>
         </a:p>
       </dgm:t>
     </dgm:pt>
@@ -7075,10 +7079,10 @@
             <a:buNone/>
           </a:pPr>
           <a:r>
-            <a:rPr lang="pt-PT" sz="1900" i="1" kern="1200" dirty="0"/>
+            <a:rPr lang="pt-PT" sz="1900" i="0" kern="1200" dirty="0"/>
             <a:t>O conceito de cidades inteligentes persistirá no futuro. </a:t>
           </a:r>
-          <a:endParaRPr lang="en-US" sz="1900" i="1" kern="1200" dirty="0"/>
+          <a:endParaRPr lang="en-US" sz="1900" i="0" kern="1200" dirty="0"/>
         </a:p>
       </dsp:txBody>
       <dsp:txXfrm>
@@ -7201,7 +7205,7 @@
             <a:buNone/>
           </a:pPr>
           <a:r>
-            <a:rPr lang="pt-PT" sz="1900" kern="1200" dirty="0"/>
+            <a:rPr lang="pt-PT" sz="1900" i="0" kern="1200" dirty="0"/>
             <a:t>As </a:t>
           </a:r>
           <a:r>
@@ -7218,13 +7222,13 @@
           </a:r>
           <a:r>
             <a:rPr lang="pt-PT" sz="1900" i="1" kern="1200" dirty="0"/>
-            <a:t> podem melhorar em muito a vida na cidade</a:t>
+            <a:t> </a:t>
           </a:r>
           <a:r>
-            <a:rPr lang="pt-PT" sz="1900" kern="1200" dirty="0"/>
-            <a:t>.</a:t>
+            <a:rPr lang="pt-PT" sz="1900" i="0" kern="1200" dirty="0"/>
+            <a:t>podem melhorar em muito a vida na cidade.</a:t>
           </a:r>
-          <a:endParaRPr lang="en-US" sz="1900" kern="1200" dirty="0"/>
+          <a:endParaRPr lang="en-US" sz="1900" i="0" kern="1200" dirty="0"/>
         </a:p>
       </dsp:txBody>
       <dsp:txXfrm>
@@ -7347,10 +7351,10 @@
             <a:buNone/>
           </a:pPr>
           <a:r>
-            <a:rPr lang="pt-PT" sz="1900" i="1" kern="1200" dirty="0"/>
+            <a:rPr lang="pt-PT" sz="1900" i="0" kern="1200" dirty="0"/>
             <a:t>Perda da privacidade da informação.</a:t>
           </a:r>
-          <a:endParaRPr lang="en-US" sz="1900" i="1" kern="1200" dirty="0"/>
+          <a:endParaRPr lang="en-US" sz="1900" i="0" kern="1200" dirty="0"/>
         </a:p>
       </dsp:txBody>
       <dsp:txXfrm>
@@ -7473,7 +7477,7 @@
             <a:buNone/>
           </a:pPr>
           <a:r>
-            <a:rPr lang="pt-PT" sz="1900" i="1" u="none" kern="1200" dirty="0"/>
+            <a:rPr lang="pt-PT" sz="1900" i="0" u="none" kern="1200" dirty="0"/>
             <a:t>Expansão das </a:t>
           </a:r>
           <a:r>
@@ -7490,7 +7494,11 @@
           </a:r>
           <a:r>
             <a:rPr lang="pt-PT" sz="1900" i="1" u="none" kern="1200" dirty="0"/>
-            <a:t> até às </a:t>
+            <a:t> </a:t>
+          </a:r>
+          <a:r>
+            <a:rPr lang="pt-PT" sz="1900" i="0" u="none" kern="1200" dirty="0"/>
+            <a:t>até às </a:t>
           </a:r>
           <a:r>
             <a:rPr lang="pt-PT" sz="1900" i="1" u="none" kern="1200" dirty="0" err="1"/>
@@ -7509,10 +7517,10 @@
             <a:t>homes</a:t>
           </a:r>
           <a:r>
-            <a:rPr lang="pt-PT" sz="1900" i="1" kern="1200" dirty="0"/>
+            <a:rPr lang="pt-PT" sz="1900" i="0" kern="1200" dirty="0"/>
             <a:t>.</a:t>
           </a:r>
-          <a:endParaRPr lang="en-US" sz="1900" i="1" kern="1200" dirty="0"/>
+          <a:endParaRPr lang="en-US" sz="1900" i="0" kern="1200" dirty="0"/>
         </a:p>
       </dsp:txBody>
       <dsp:txXfrm>
@@ -15245,7 +15253,7 @@
           <a:p>
             <a:fld id="{ACCCF879-775B-4DC1-9F92-801A9C2ADE8A}" type="datetimeFigureOut">
               <a:rPr lang="pt-PT" smtClean="0"/>
-              <a:t>29/04/2018</a:t>
+              <a:t>30/04/2018</a:t>
             </a:fld>
             <a:endParaRPr lang="pt-PT"/>
           </a:p>
@@ -15654,7 +15662,7 @@
           <a:p>
             <a:fld id="{E06EBAFE-E282-407E-8820-D659E2DE0CBE}" type="datetime1">
               <a:rPr lang="pt-PT" smtClean="0"/>
-              <a:t>29/04/2018</a:t>
+              <a:t>30/04/2018</a:t>
             </a:fld>
             <a:endParaRPr lang="pt-PT"/>
           </a:p>
@@ -15827,7 +15835,7 @@
           <a:p>
             <a:fld id="{B186F18B-7D61-4563-ABFD-17E528511FDB}" type="datetime1">
               <a:rPr lang="pt-PT" smtClean="0"/>
-              <a:t>29/04/2018</a:t>
+              <a:t>30/04/2018</a:t>
             </a:fld>
             <a:endParaRPr lang="pt-PT"/>
           </a:p>
@@ -16010,7 +16018,7 @@
           <a:p>
             <a:fld id="{CD816DD2-A480-4633-B0DD-D245FF7C9851}" type="datetime1">
               <a:rPr lang="pt-PT" smtClean="0"/>
-              <a:t>29/04/2018</a:t>
+              <a:t>30/04/2018</a:t>
             </a:fld>
             <a:endParaRPr lang="pt-PT"/>
           </a:p>
@@ -16300,7 +16308,7 @@
           <a:p>
             <a:fld id="{0360BB6C-A1E5-474D-A7EA-6FAD50C04660}" type="datetime1">
               <a:rPr lang="pt-PT" smtClean="0"/>
-              <a:t>29/04/2018</a:t>
+              <a:t>30/04/2018</a:t>
             </a:fld>
             <a:endParaRPr lang="pt-PT"/>
           </a:p>
@@ -16511,7 +16519,7 @@
           <a:p>
             <a:fld id="{DFA68BEE-7741-4769-A3C2-66E79D2B7CE6}" type="datetime1">
               <a:rPr lang="pt-PT" smtClean="0"/>
-              <a:t>29/04/2018</a:t>
+              <a:t>30/04/2018</a:t>
             </a:fld>
             <a:endParaRPr lang="pt-PT"/>
           </a:p>
@@ -16857,7 +16865,7 @@
           <a:p>
             <a:fld id="{A64B67C4-7D96-4CE4-9E59-98772F728B11}" type="datetime1">
               <a:rPr lang="pt-PT" smtClean="0"/>
-              <a:t>29/04/2018</a:t>
+              <a:t>30/04/2018</a:t>
             </a:fld>
             <a:endParaRPr lang="pt-PT"/>
           </a:p>
@@ -17135,7 +17143,7 @@
           <a:p>
             <a:fld id="{30ABDD8A-F922-4145-BB5C-0303F89811F4}" type="datetime1">
               <a:rPr lang="pt-PT" smtClean="0"/>
-              <a:t>29/04/2018</a:t>
+              <a:t>30/04/2018</a:t>
             </a:fld>
             <a:endParaRPr lang="pt-PT"/>
           </a:p>
@@ -17517,7 +17525,7 @@
           <a:p>
             <a:fld id="{766049C1-E83B-47B7-9B0C-78EF12E7619D}" type="datetime1">
               <a:rPr lang="pt-PT" smtClean="0"/>
-              <a:t>29/04/2018</a:t>
+              <a:t>30/04/2018</a:t>
             </a:fld>
             <a:endParaRPr lang="pt-PT"/>
           </a:p>
@@ -17638,7 +17646,7 @@
           <a:p>
             <a:fld id="{411C1CCD-3CE9-4213-A0E6-B643AF06A7FD}" type="datetime1">
               <a:rPr lang="pt-PT" smtClean="0"/>
-              <a:t>29/04/2018</a:t>
+              <a:t>30/04/2018</a:t>
             </a:fld>
             <a:endParaRPr lang="pt-PT"/>
           </a:p>
@@ -17812,7 +17820,7 @@
           <a:p>
             <a:fld id="{B819019D-39D5-4615-8350-E181390DF522}" type="datetime1">
               <a:rPr lang="pt-PT" smtClean="0"/>
-              <a:t>29/04/2018</a:t>
+              <a:t>30/04/2018</a:t>
             </a:fld>
             <a:endParaRPr lang="pt-PT"/>
           </a:p>
@@ -18169,7 +18177,7 @@
           <a:p>
             <a:fld id="{F6BDEB3B-92AD-4BF5-8244-A285DC232243}" type="datetime1">
               <a:rPr lang="pt-PT" smtClean="0"/>
-              <a:t>29/04/2018</a:t>
+              <a:t>30/04/2018</a:t>
             </a:fld>
             <a:endParaRPr lang="pt-PT"/>
           </a:p>
@@ -18363,7 +18371,7 @@
           <a:p>
             <a:fld id="{822D2295-34CD-4C4E-827E-28605EC01E4D}" type="datetime1">
               <a:rPr lang="pt-PT" smtClean="0"/>
-              <a:t>29/04/2018</a:t>
+              <a:t>30/04/2018</a:t>
             </a:fld>
             <a:endParaRPr lang="pt-PT"/>
           </a:p>
@@ -18722,7 +18730,7 @@
           <a:p>
             <a:fld id="{03422FC1-B2AB-4D1E-A33C-2F66269BCB5F}" type="datetime1">
               <a:rPr lang="pt-PT" smtClean="0"/>
-              <a:t>29/04/2018</a:t>
+              <a:t>30/04/2018</a:t>
             </a:fld>
             <a:endParaRPr lang="pt-PT"/>
           </a:p>
@@ -18895,7 +18903,7 @@
           <a:p>
             <a:fld id="{3E53A5E1-7DB7-4EDF-A26C-9A2D50A97012}" type="datetime1">
               <a:rPr lang="pt-PT" smtClean="0"/>
-              <a:t>29/04/2018</a:t>
+              <a:t>30/04/2018</a:t>
             </a:fld>
             <a:endParaRPr lang="pt-PT"/>
           </a:p>
@@ -19154,7 +19162,7 @@
           <a:p>
             <a:fld id="{BE5883F6-086F-45A2-AF2C-8BC8C02A0CC7}" type="datetime1">
               <a:rPr lang="pt-PT" smtClean="0"/>
-              <a:t>29/04/2018</a:t>
+              <a:t>30/04/2018</a:t>
             </a:fld>
             <a:endParaRPr lang="pt-PT"/>
           </a:p>
@@ -19408,7 +19416,7 @@
           <a:p>
             <a:fld id="{3BEDBF07-148A-4E3E-8BB9-8A4F430559B3}" type="datetime1">
               <a:rPr lang="pt-PT" smtClean="0"/>
-              <a:t>29/04/2018</a:t>
+              <a:t>30/04/2018</a:t>
             </a:fld>
             <a:endParaRPr lang="pt-PT"/>
           </a:p>
@@ -19643,7 +19651,7 @@
           <a:p>
             <a:fld id="{C30C56F1-5D12-43F8-A6B4-EF57E60989A5}" type="datetime1">
               <a:rPr lang="pt-PT" smtClean="0"/>
-              <a:t>29/04/2018</a:t>
+              <a:t>30/04/2018</a:t>
             </a:fld>
             <a:endParaRPr lang="pt-PT"/>
           </a:p>
@@ -19993,7 +20001,7 @@
           <a:p>
             <a:fld id="{706B5CB6-49D5-42A0-9C67-0F8195B9C72F}" type="datetime1">
               <a:rPr lang="pt-PT" smtClean="0"/>
-              <a:t>29/04/2018</a:t>
+              <a:t>30/04/2018</a:t>
             </a:fld>
             <a:endParaRPr lang="pt-PT"/>
           </a:p>
@@ -20114,7 +20122,7 @@
           <a:p>
             <a:fld id="{E5B22639-E731-4079-AF82-529E2315F231}" type="datetime1">
               <a:rPr lang="pt-PT" smtClean="0"/>
-              <a:t>29/04/2018</a:t>
+              <a:t>30/04/2018</a:t>
             </a:fld>
             <a:endParaRPr lang="pt-PT"/>
           </a:p>
@@ -20235,7 +20243,7 @@
           <a:p>
             <a:fld id="{4F13C1C9-920F-4A26-BEBB-E4EF9B5216D5}" type="datetime1">
               <a:rPr lang="pt-PT" smtClean="0"/>
-              <a:t>29/04/2018</a:t>
+              <a:t>30/04/2018</a:t>
             </a:fld>
             <a:endParaRPr lang="pt-PT"/>
           </a:p>
@@ -20522,7 +20530,7 @@
           <a:p>
             <a:fld id="{5B4A7865-2456-4903-A2F1-CA6C5A16AF69}" type="datetime1">
               <a:rPr lang="pt-PT" smtClean="0"/>
-              <a:t>29/04/2018</a:t>
+              <a:t>30/04/2018</a:t>
             </a:fld>
             <a:endParaRPr lang="pt-PT"/>
           </a:p>
@@ -20789,7 +20797,7 @@
           <a:p>
             <a:fld id="{207FD7B2-AAE8-4EB3-B5C8-8574E566C19F}" type="datetime1">
               <a:rPr lang="pt-PT" smtClean="0"/>
-              <a:t>29/04/2018</a:t>
+              <a:t>30/04/2018</a:t>
             </a:fld>
             <a:endParaRPr lang="pt-PT"/>
           </a:p>
@@ -21006,7 +21014,7 @@
           <a:p>
             <a:fld id="{B8E86262-7B0C-43F5-9B8A-33474B1C6356}" type="datetime1">
               <a:rPr lang="pt-PT" smtClean="0"/>
-              <a:t>29/04/2018</a:t>
+              <a:t>30/04/2018</a:t>
             </a:fld>
             <a:endParaRPr lang="pt-PT"/>
           </a:p>
@@ -21613,7 +21621,7 @@
           <a:p>
             <a:fld id="{EE09A993-B8DA-43F8-BF4A-B4C4CC0771DF}" type="datetime1">
               <a:rPr lang="pt-PT" smtClean="0"/>
-              <a:t>29/04/2018</a:t>
+              <a:t>30/04/2018</a:t>
             </a:fld>
             <a:endParaRPr lang="pt-PT"/>
           </a:p>
@@ -22411,7 +22419,7 @@
                 </a:solidFill>
                 <a:latin typeface="Century Gothic" panose="020B0502020202020204" pitchFamily="34" charset="0"/>
               </a:rPr>
-              <a:t>29/04/2018</a:t>
+              <a:t>30/04/2018</a:t>
             </a:fld>
             <a:endParaRPr lang="pt-PT" sz="1600" dirty="0">
               <a:solidFill>
@@ -22796,7 +22804,7 @@
                   <a:spcPts val="600"/>
                 </a:spcAft>
               </a:pPr>
-              <a:t>29/04/2018</a:t>
+              <a:t>30/04/2018</a:t>
             </a:fld>
             <a:endParaRPr lang="pt-PT" dirty="0">
               <a:latin typeface="Century Gothic" panose="020B0502020202020204" pitchFamily="34" charset="0"/>
@@ -23258,7 +23266,7 @@
               <a:rPr lang="pt-PT" sz="1400" smtClean="0">
                 <a:latin typeface="Century Gothic" panose="020B0502020202020204" pitchFamily="34" charset="0"/>
               </a:rPr>
-              <a:t>29/04/2018</a:t>
+              <a:t>30/04/2018</a:t>
             </a:fld>
             <a:endParaRPr lang="pt-PT" sz="1400" dirty="0">
               <a:latin typeface="Century Gothic" panose="020B0502020202020204" pitchFamily="34" charset="0"/>
@@ -23421,7 +23429,7 @@
                 <a:latin typeface="Century Gothic" panose="020B0502020202020204" pitchFamily="34" charset="0"/>
               </a:rPr>
               <a:pPr/>
-              <a:t>29/04/2018</a:t>
+              <a:t>30/04/2018</a:t>
             </a:fld>
             <a:endParaRPr lang="pt-PT" dirty="0">
               <a:latin typeface="Century Gothic" panose="020B0502020202020204" pitchFamily="34" charset="0"/>
@@ -23703,7 +23711,7 @@
               <a:rPr lang="pt-PT" sz="1400" smtClean="0">
                 <a:latin typeface="Century Gothic" panose="020B0502020202020204" pitchFamily="34" charset="0"/>
               </a:rPr>
-              <a:t>29/04/2018</a:t>
+              <a:t>30/04/2018</a:t>
             </a:fld>
             <a:endParaRPr lang="pt-PT" sz="1400" dirty="0">
               <a:latin typeface="Century Gothic" panose="020B0502020202020204" pitchFamily="34" charset="0"/>
@@ -24292,7 +24300,7 @@
               <a:rPr lang="pt-PT" sz="1400" smtClean="0">
                 <a:latin typeface="Century Gothic" panose="020B0502020202020204" pitchFamily="34" charset="0"/>
               </a:rPr>
-              <a:t>29/04/2018</a:t>
+              <a:t>30/04/2018</a:t>
             </a:fld>
             <a:endParaRPr lang="pt-PT" sz="1400" dirty="0">
               <a:latin typeface="Century Gothic" panose="020B0502020202020204" pitchFamily="34" charset="0"/>
@@ -24781,7 +24789,7 @@
         </p:blipFill>
         <p:spPr>
           <a:xfrm>
-            <a:off x="2812856" y="2974492"/>
+            <a:off x="2812856" y="2971317"/>
             <a:ext cx="374844" cy="374844"/>
           </a:xfrm>
           <a:prstGeom prst="rect">
@@ -25181,7 +25189,7 @@
               <a:rPr lang="pt-PT" sz="1400" smtClean="0">
                 <a:latin typeface="Century Gothic" panose="020B0502020202020204" pitchFamily="34" charset="0"/>
               </a:rPr>
-              <a:t>29/04/2018</a:t>
+              <a:t>30/04/2018</a:t>
             </a:fld>
             <a:endParaRPr lang="en-US" sz="1400" dirty="0">
               <a:latin typeface="Century Gothic" panose="020B0502020202020204" pitchFamily="34" charset="0"/>
@@ -25358,7 +25366,7 @@
             <p:ph idx="1"/>
             <p:extLst>
               <p:ext uri="{D42A27DB-BD31-4B8C-83A1-F6EECF244321}">
-                <p14:modId xmlns:p14="http://schemas.microsoft.com/office/powerpoint/2010/main" val="2964902178"/>
+                <p14:modId xmlns:p14="http://schemas.microsoft.com/office/powerpoint/2010/main" val="3013371311"/>
               </p:ext>
             </p:extLst>
           </p:nvPr>

</xml_diff>